<commit_message>
Added problem description for our version controlled project.
</commit_message>
<xml_diff>
--- a/slides/Intermediate_Room_Slides.pptx
+++ b/slides/Intermediate_Room_Slides.pptx
@@ -5,14 +5,15 @@
     <p:sldMasterId id="2147483648" r:id="rId1"/>
   </p:sldMasterIdLst>
   <p:notesMasterIdLst>
-    <p:notesMasterId r:id="rId4"/>
+    <p:notesMasterId r:id="rId5"/>
   </p:notesMasterIdLst>
   <p:handoutMasterIdLst>
-    <p:handoutMasterId r:id="rId5"/>
+    <p:handoutMasterId r:id="rId6"/>
   </p:handoutMasterIdLst>
   <p:sldIdLst>
     <p:sldId id="257" r:id="rId2"/>
     <p:sldId id="256" r:id="rId3"/>
+    <p:sldId id="258" r:id="rId4"/>
   </p:sldIdLst>
   <p:sldSz cx="9144000" cy="6858000" type="screen4x3"/>
   <p:notesSz cx="6858000" cy="9144000"/>
@@ -196,6 +197,7 @@
           <a:p>
             <a:fld id="{B5C3CD95-B8D1-45AC-82B0-C8AA26EB3752}" type="datetimeFigureOut">
               <a:rPr lang="en-US" smtClean="0"/>
+              <a:pPr/>
               <a:t>3/16/2014</a:t>
             </a:fld>
             <a:endParaRPr lang="en-US"/>
@@ -262,6 +264,7 @@
           <a:p>
             <a:fld id="{DB33E828-057C-47C9-B359-505E881DB432}" type="slidenum">
               <a:rPr lang="en-US" smtClean="0"/>
+              <a:pPr/>
               <a:t>‹#›</a:t>
             </a:fld>
             <a:endParaRPr lang="en-US"/>
@@ -357,6 +360,7 @@
           <a:p>
             <a:fld id="{839F6F7E-DFB2-40A6-B804-DD12C199FDD4}" type="datetimeFigureOut">
               <a:rPr lang="en-US" smtClean="0"/>
+              <a:pPr/>
               <a:t>3/16/2014</a:t>
             </a:fld>
             <a:endParaRPr lang="en-US"/>
@@ -518,6 +522,7 @@
           <a:p>
             <a:fld id="{970C30CB-04E9-48C5-9F63-87F1FADCED0C}" type="slidenum">
               <a:rPr lang="en-US" smtClean="0"/>
+              <a:pPr/>
               <a:t>‹#›</a:t>
             </a:fld>
             <a:endParaRPr lang="en-US"/>
@@ -804,6 +809,7 @@
           <a:p>
             <a:fld id="{8317CE32-67F1-4D9B-A4D7-E4D9B012EE5C}" type="datetimeFigureOut">
               <a:rPr lang="en-US" smtClean="0"/>
+              <a:pPr/>
               <a:t>3/16/2014</a:t>
             </a:fld>
             <a:endParaRPr lang="en-US"/>
@@ -846,6 +852,7 @@
           <a:p>
             <a:fld id="{8529ED16-87D1-44B0-81BF-3BDA5065C8E3}" type="slidenum">
               <a:rPr lang="en-US" smtClean="0"/>
+              <a:pPr/>
               <a:t>‹#›</a:t>
             </a:fld>
             <a:endParaRPr lang="en-US"/>
@@ -970,6 +977,7 @@
           <a:p>
             <a:fld id="{1C833ACE-80BB-4808-8759-9B23EB6C9396}" type="datetime5">
               <a:rPr lang="en-US" smtClean="0"/>
+              <a:pPr/>
               <a:t>16-Mar-14</a:t>
             </a:fld>
             <a:endParaRPr lang="en-US"/>
@@ -1012,6 +1020,7 @@
           <a:p>
             <a:fld id="{8529ED16-87D1-44B0-81BF-3BDA5065C8E3}" type="slidenum">
               <a:rPr lang="en-US" smtClean="0"/>
+              <a:pPr/>
               <a:t>‹#›</a:t>
             </a:fld>
             <a:endParaRPr lang="en-US"/>
@@ -1146,6 +1155,7 @@
           <a:p>
             <a:fld id="{F078C379-987A-49D8-B35F-503DA9A6EF98}" type="datetime5">
               <a:rPr lang="en-US" smtClean="0"/>
+              <a:pPr/>
               <a:t>16-Mar-14</a:t>
             </a:fld>
             <a:endParaRPr lang="en-US"/>
@@ -1188,6 +1198,7 @@
           <a:p>
             <a:fld id="{8529ED16-87D1-44B0-81BF-3BDA5065C8E3}" type="slidenum">
               <a:rPr lang="en-US" smtClean="0"/>
+              <a:pPr/>
               <a:t>‹#›</a:t>
             </a:fld>
             <a:endParaRPr lang="en-US"/>
@@ -1312,6 +1323,7 @@
           <a:p>
             <a:fld id="{2A81CE75-AB90-406B-B7AA-27CDE3E9F509}" type="datetime5">
               <a:rPr lang="en-US" smtClean="0"/>
+              <a:pPr/>
               <a:t>16-Mar-14</a:t>
             </a:fld>
             <a:endParaRPr lang="en-US"/>
@@ -1354,6 +1366,7 @@
           <a:p>
             <a:fld id="{8529ED16-87D1-44B0-81BF-3BDA5065C8E3}" type="slidenum">
               <a:rPr lang="en-US" smtClean="0"/>
+              <a:pPr/>
               <a:t>‹#›</a:t>
             </a:fld>
             <a:endParaRPr lang="en-US"/>
@@ -1554,6 +1567,7 @@
           <a:p>
             <a:fld id="{215D865A-F336-4891-901A-7817CB38541B}" type="datetime5">
               <a:rPr lang="en-US" smtClean="0"/>
+              <a:pPr/>
               <a:t>16-Mar-14</a:t>
             </a:fld>
             <a:endParaRPr lang="en-US"/>
@@ -1596,6 +1610,7 @@
           <a:p>
             <a:fld id="{8529ED16-87D1-44B0-81BF-3BDA5065C8E3}" type="slidenum">
               <a:rPr lang="en-US" smtClean="0"/>
+              <a:pPr/>
               <a:t>‹#›</a:t>
             </a:fld>
             <a:endParaRPr lang="en-US"/>
@@ -1838,6 +1853,7 @@
           <a:p>
             <a:fld id="{D72E704C-6A8B-4484-B254-5A41BE5845FA}" type="datetime5">
               <a:rPr lang="en-US" smtClean="0"/>
+              <a:pPr/>
               <a:t>16-Mar-14</a:t>
             </a:fld>
             <a:endParaRPr lang="en-US"/>
@@ -1880,6 +1896,7 @@
           <a:p>
             <a:fld id="{8529ED16-87D1-44B0-81BF-3BDA5065C8E3}" type="slidenum">
               <a:rPr lang="en-US" smtClean="0"/>
+              <a:pPr/>
               <a:t>‹#›</a:t>
             </a:fld>
             <a:endParaRPr lang="en-US"/>
@@ -2256,6 +2273,7 @@
           <a:p>
             <a:fld id="{D0D55AAE-05F1-49BF-8A2B-C07AF46A8603}" type="datetime5">
               <a:rPr lang="en-US" smtClean="0"/>
+              <a:pPr/>
               <a:t>16-Mar-14</a:t>
             </a:fld>
             <a:endParaRPr lang="en-US"/>
@@ -2298,6 +2316,7 @@
           <a:p>
             <a:fld id="{8529ED16-87D1-44B0-81BF-3BDA5065C8E3}" type="slidenum">
               <a:rPr lang="en-US" smtClean="0"/>
+              <a:pPr/>
               <a:t>‹#›</a:t>
             </a:fld>
             <a:endParaRPr lang="en-US"/>
@@ -2370,6 +2389,7 @@
           <a:p>
             <a:fld id="{A53DD456-4091-4757-AFCF-80A2534ECDF4}" type="datetime5">
               <a:rPr lang="en-US" smtClean="0"/>
+              <a:pPr/>
               <a:t>16-Mar-14</a:t>
             </a:fld>
             <a:endParaRPr lang="en-US"/>
@@ -2412,6 +2432,7 @@
           <a:p>
             <a:fld id="{8529ED16-87D1-44B0-81BF-3BDA5065C8E3}" type="slidenum">
               <a:rPr lang="en-US" smtClean="0"/>
+              <a:pPr/>
               <a:t>‹#›</a:t>
             </a:fld>
             <a:endParaRPr lang="en-US"/>
@@ -2461,6 +2482,7 @@
           <a:p>
             <a:fld id="{DDD8FA1F-B3B5-490F-8D85-D73408F8AFD8}" type="datetime5">
               <a:rPr lang="en-US" smtClean="0"/>
+              <a:pPr/>
               <a:t>16-Mar-14</a:t>
             </a:fld>
             <a:endParaRPr lang="en-US"/>
@@ -2503,6 +2525,7 @@
           <a:p>
             <a:fld id="{8529ED16-87D1-44B0-81BF-3BDA5065C8E3}" type="slidenum">
               <a:rPr lang="en-US" smtClean="0"/>
+              <a:pPr/>
               <a:t>‹#›</a:t>
             </a:fld>
             <a:endParaRPr lang="en-US"/>
@@ -2734,6 +2757,7 @@
           <a:p>
             <a:fld id="{64D65654-A3A4-4C27-AFF6-D79A38C6622B}" type="datetime5">
               <a:rPr lang="en-US" smtClean="0"/>
+              <a:pPr/>
               <a:t>16-Mar-14</a:t>
             </a:fld>
             <a:endParaRPr lang="en-US"/>
@@ -2776,6 +2800,7 @@
           <a:p>
             <a:fld id="{8529ED16-87D1-44B0-81BF-3BDA5065C8E3}" type="slidenum">
               <a:rPr lang="en-US" smtClean="0"/>
+              <a:pPr/>
               <a:t>‹#›</a:t>
             </a:fld>
             <a:endParaRPr lang="en-US"/>
@@ -2983,6 +3008,7 @@
           <a:p>
             <a:fld id="{9C9AD8E5-FE16-40F9-B7E0-86F9E6125374}" type="datetime5">
               <a:rPr lang="en-US" smtClean="0"/>
+              <a:pPr/>
               <a:t>16-Mar-14</a:t>
             </a:fld>
             <a:endParaRPr lang="en-US"/>
@@ -3025,6 +3051,7 @@
           <a:p>
             <a:fld id="{8529ED16-87D1-44B0-81BF-3BDA5065C8E3}" type="slidenum">
               <a:rPr lang="en-US" smtClean="0"/>
+              <a:pPr/>
               <a:t>‹#›</a:t>
             </a:fld>
             <a:endParaRPr lang="en-US"/>
@@ -3192,6 +3219,7 @@
           <a:p>
             <a:fld id="{8317CE32-67F1-4D9B-A4D7-E4D9B012EE5C}" type="datetimeFigureOut">
               <a:rPr lang="en-US" smtClean="0"/>
+              <a:pPr/>
               <a:t>3/16/2014</a:t>
             </a:fld>
             <a:endParaRPr lang="en-US"/>
@@ -3270,6 +3298,7 @@
           <a:p>
             <a:fld id="{8529ED16-87D1-44B0-81BF-3BDA5065C8E3}" type="slidenum">
               <a:rPr lang="en-US" smtClean="0"/>
+              <a:pPr/>
               <a:t>‹#›</a:t>
             </a:fld>
             <a:endParaRPr lang="en-US"/>
@@ -3658,6 +3687,103 @@
       </p:par>
     </p:tnLst>
   </p:timing>
+</p:sld>
+</file>
+
+<file path=ppt/slides/slide3.xml><?xml version="1.0" encoding="utf-8"?>
+<p:sld xmlns:a="http://schemas.openxmlformats.org/drawingml/2006/main" xmlns:r="http://schemas.openxmlformats.org/officeDocument/2006/relationships" xmlns:p="http://schemas.openxmlformats.org/presentationml/2006/main">
+  <p:cSld>
+    <p:spTree>
+      <p:nvGrpSpPr>
+        <p:cNvPr id="1" name=""/>
+        <p:cNvGrpSpPr/>
+        <p:nvPr/>
+      </p:nvGrpSpPr>
+      <p:grpSpPr>
+        <a:xfrm>
+          <a:off x="0" y="0"/>
+          <a:ext cx="0" cy="0"/>
+          <a:chOff x="0" y="0"/>
+          <a:chExt cx="0" cy="0"/>
+        </a:xfrm>
+      </p:grpSpPr>
+      <p:sp>
+        <p:nvSpPr>
+          <p:cNvPr id="2" name="Title 1"/>
+          <p:cNvSpPr>
+            <a:spLocks noGrp="1"/>
+          </p:cNvSpPr>
+          <p:nvPr>
+            <p:ph type="title"/>
+          </p:nvPr>
+        </p:nvSpPr>
+        <p:spPr/>
+        <p:txBody>
+          <a:bodyPr/>
+          <a:lstStyle/>
+          <a:p>
+            <a:r>
+              <a:rPr lang="en-US" dirty="0" smtClean="0"/>
+              <a:t>Opening</a:t>
+            </a:r>
+            <a:endParaRPr lang="en-US" dirty="0"/>
+          </a:p>
+        </p:txBody>
+      </p:sp>
+      <p:sp>
+        <p:nvSpPr>
+          <p:cNvPr id="4" name="Rectangle 3"/>
+          <p:cNvSpPr/>
+          <p:nvPr/>
+        </p:nvSpPr>
+        <p:spPr>
+          <a:xfrm>
+            <a:off x="1066800" y="2005548"/>
+            <a:ext cx="6934200" cy="3416320"/>
+          </a:xfrm>
+          <a:prstGeom prst="rect">
+            <a:avLst/>
+          </a:prstGeom>
+        </p:spPr>
+        <p:txBody>
+          <a:bodyPr wrap="square">
+            <a:spAutoFit/>
+          </a:bodyPr>
+          <a:lstStyle/>
+          <a:p>
+            <a:r>
+              <a:rPr lang="en-US" sz="2400" dirty="0" err="1" smtClean="0"/>
+              <a:t>Wolfman</a:t>
+            </a:r>
+            <a:r>
+              <a:rPr lang="en-US" sz="2400" dirty="0" smtClean="0"/>
+              <a:t> and Dracula have been hired by Universal Missions </a:t>
+            </a:r>
+            <a:r>
+              <a:rPr lang="en-US" sz="2400" dirty="0" smtClean="0"/>
+              <a:t>to </a:t>
+            </a:r>
+            <a:r>
+              <a:rPr lang="en-US" sz="2400" dirty="0" smtClean="0"/>
+              <a:t>figure out where the company should send its next planetary </a:t>
+            </a:r>
+            <a:r>
+              <a:rPr lang="en-US" sz="2400" dirty="0" err="1" smtClean="0"/>
+              <a:t>lander</a:t>
+            </a:r>
+            <a:r>
+              <a:rPr lang="en-US" sz="2400" dirty="0" smtClean="0"/>
+              <a:t>. They want to be able to work on the plans at the same time, but they have run into problems doing this in the past. If they take turns, each one will spend a lot of time waiting for the other to finish. On the other hand, if they work on their own copies and email changes back and forth they know that things will be lost, overwritten, or duplicated.</a:t>
+            </a:r>
+            <a:endParaRPr lang="en-US" sz="2400" dirty="0"/>
+          </a:p>
+        </p:txBody>
+      </p:sp>
+    </p:spTree>
+  </p:cSld>
+  <p:clrMapOvr>
+    <a:masterClrMapping/>
+  </p:clrMapOvr>
 </p:sld>
 </file>
 

</xml_diff>

<commit_message>
Added links in slides.
</commit_message>
<xml_diff>
--- a/slides/Intermediate_Room_Slides.pptx
+++ b/slides/Intermediate_Room_Slides.pptx
@@ -5,15 +5,17 @@
     <p:sldMasterId id="2147483648" r:id="rId1"/>
   </p:sldMasterIdLst>
   <p:notesMasterIdLst>
-    <p:notesMasterId r:id="rId5"/>
+    <p:notesMasterId r:id="rId7"/>
   </p:notesMasterIdLst>
   <p:handoutMasterIdLst>
-    <p:handoutMasterId r:id="rId6"/>
+    <p:handoutMasterId r:id="rId8"/>
   </p:handoutMasterIdLst>
   <p:sldIdLst>
     <p:sldId id="257" r:id="rId2"/>
     <p:sldId id="256" r:id="rId3"/>
     <p:sldId id="258" r:id="rId4"/>
+    <p:sldId id="259" r:id="rId5"/>
+    <p:sldId id="260" r:id="rId6"/>
   </p:sldIdLst>
   <p:sldSz cx="9144000" cy="6858000" type="screen4x3"/>
   <p:notesSz cx="6858000" cy="9144000"/>
@@ -3629,6 +3631,13 @@
   <p:clrMapOvr>
     <a:masterClrMapping/>
   </p:clrMapOvr>
+  <p:timing>
+    <p:tnLst>
+      <p:par>
+        <p:cTn id="1" dur="indefinite" restart="never" nodeType="tmRoot"/>
+      </p:par>
+    </p:tnLst>
+  </p:timing>
 </p:sld>
 </file>
 
@@ -3776,6 +3785,141 @@
               <a:t>. They want to be able to work on the plans at the same time, but they have run into problems doing this in the past. If they take turns, each one will spend a lot of time waiting for the other to finish. On the other hand, if they work on their own copies and email changes back and forth they know that things will be lost, overwritten, or duplicated.</a:t>
             </a:r>
             <a:endParaRPr lang="en-US" sz="2400" dirty="0"/>
+          </a:p>
+        </p:txBody>
+      </p:sp>
+    </p:spTree>
+  </p:cSld>
+  <p:clrMapOvr>
+    <a:masterClrMapping/>
+  </p:clrMapOvr>
+  <p:timing>
+    <p:tnLst>
+      <p:par>
+        <p:cTn id="1" dur="indefinite" restart="never" nodeType="tmRoot"/>
+      </p:par>
+    </p:tnLst>
+  </p:timing>
+</p:sld>
+</file>
+
+<file path=ppt/slides/slide4.xml><?xml version="1.0" encoding="utf-8"?>
+<p:sld xmlns:a="http://schemas.openxmlformats.org/drawingml/2006/main" xmlns:r="http://schemas.openxmlformats.org/officeDocument/2006/relationships" xmlns:p="http://schemas.openxmlformats.org/presentationml/2006/main">
+  <p:cSld>
+    <p:spTree>
+      <p:nvGrpSpPr>
+        <p:cNvPr id="1" name=""/>
+        <p:cNvGrpSpPr/>
+        <p:nvPr/>
+      </p:nvGrpSpPr>
+      <p:grpSpPr>
+        <a:xfrm>
+          <a:off x="0" y="0"/>
+          <a:ext cx="0" cy="0"/>
+          <a:chOff x="0" y="0"/>
+          <a:chExt cx="0" cy="0"/>
+        </a:xfrm>
+      </p:grpSpPr>
+      <p:sp>
+        <p:nvSpPr>
+          <p:cNvPr id="3" name="Content Placeholder 2"/>
+          <p:cNvSpPr>
+            <a:spLocks noGrp="1"/>
+          </p:cNvSpPr>
+          <p:nvPr>
+            <p:ph idx="1"/>
+          </p:nvPr>
+        </p:nvSpPr>
+        <p:spPr>
+          <a:xfrm>
+            <a:off x="457200" y="2514600"/>
+            <a:ext cx="8229600" cy="1600200"/>
+          </a:xfrm>
+        </p:spPr>
+        <p:txBody>
+          <a:bodyPr/>
+          <a:lstStyle/>
+          <a:p>
+            <a:pPr>
+              <a:buNone/>
+            </a:pPr>
+            <a:r>
+              <a:rPr lang="en-US" dirty="0" smtClean="0"/>
+              <a:t>https://github.com/mattphotonman/2014-03-17-nyu-exercises</a:t>
+            </a:r>
+            <a:endParaRPr lang="en-US" dirty="0"/>
+          </a:p>
+        </p:txBody>
+      </p:sp>
+    </p:spTree>
+  </p:cSld>
+  <p:clrMapOvr>
+    <a:masterClrMapping/>
+  </p:clrMapOvr>
+</p:sld>
+</file>
+
+<file path=ppt/slides/slide5.xml><?xml version="1.0" encoding="utf-8"?>
+<p:sld xmlns:a="http://schemas.openxmlformats.org/drawingml/2006/main" xmlns:r="http://schemas.openxmlformats.org/officeDocument/2006/relationships" xmlns:p="http://schemas.openxmlformats.org/presentationml/2006/main">
+  <p:cSld>
+    <p:spTree>
+      <p:nvGrpSpPr>
+        <p:cNvPr id="1" name=""/>
+        <p:cNvGrpSpPr/>
+        <p:nvPr/>
+      </p:nvGrpSpPr>
+      <p:grpSpPr>
+        <a:xfrm>
+          <a:off x="0" y="0"/>
+          <a:ext cx="0" cy="0"/>
+          <a:chOff x="0" y="0"/>
+          <a:chExt cx="0" cy="0"/>
+        </a:xfrm>
+      </p:grpSpPr>
+      <p:sp>
+        <p:nvSpPr>
+          <p:cNvPr id="3" name="Content Placeholder 2"/>
+          <p:cNvSpPr>
+            <a:spLocks noGrp="1"/>
+          </p:cNvSpPr>
+          <p:nvPr>
+            <p:ph idx="1"/>
+          </p:nvPr>
+        </p:nvSpPr>
+        <p:spPr>
+          <a:xfrm>
+            <a:off x="457200" y="2514600"/>
+            <a:ext cx="8229600" cy="1447800"/>
+          </a:xfrm>
+        </p:spPr>
+        <p:txBody>
+          <a:bodyPr/>
+          <a:lstStyle/>
+          <a:p>
+            <a:pPr>
+              <a:buNone/>
+            </a:pPr>
+            <a:r>
+              <a:rPr lang="en-US" dirty="0" err="1" smtClean="0"/>
+              <a:t>g</a:t>
+            </a:r>
+            <a:r>
+              <a:rPr lang="en-US" dirty="0" err="1" smtClean="0"/>
+              <a:t>it</a:t>
+            </a:r>
+            <a:r>
+              <a:rPr lang="en-US" dirty="0" smtClean="0"/>
+              <a:t> clone https</a:t>
+            </a:r>
+            <a:r>
+              <a:rPr lang="en-US" dirty="0" smtClean="0"/>
+              <a:t>://github.com</a:t>
+            </a:r>
+            <a:r>
+              <a:rPr lang="en-US" dirty="0" smtClean="0"/>
+              <a:t>/&lt;username&gt;/2014-03-17-nyu-exercises.git</a:t>
+            </a:r>
+            <a:endParaRPr lang="en-US" dirty="0"/>
           </a:p>
         </p:txBody>
       </p:sp>

</xml_diff>

<commit_message>
Added title slide for python.
</commit_message>
<xml_diff>
--- a/slides/Intermediate_Room_Slides.pptx
+++ b/slides/Intermediate_Room_Slides.pptx
@@ -5,10 +5,10 @@
     <p:sldMasterId id="2147483648" r:id="rId1"/>
   </p:sldMasterIdLst>
   <p:notesMasterIdLst>
-    <p:notesMasterId r:id="rId7"/>
+    <p:notesMasterId r:id="rId8"/>
   </p:notesMasterIdLst>
   <p:handoutMasterIdLst>
-    <p:handoutMasterId r:id="rId8"/>
+    <p:handoutMasterId r:id="rId9"/>
   </p:handoutMasterIdLst>
   <p:sldIdLst>
     <p:sldId id="257" r:id="rId2"/>
@@ -16,6 +16,7 @@
     <p:sldId id="258" r:id="rId4"/>
     <p:sldId id="259" r:id="rId5"/>
     <p:sldId id="260" r:id="rId6"/>
+    <p:sldId id="261" r:id="rId7"/>
   </p:sldIdLst>
   <p:sldSz cx="9144000" cy="6858000" type="screen4x3"/>
   <p:notesSz cx="6858000" cy="9144000"/>
@@ -3918,6 +3919,59 @@
             <a:r>
               <a:rPr lang="en-US" dirty="0" smtClean="0"/>
               <a:t>/&lt;username&gt;/2014-03-17-nyu-exercises.git</a:t>
+            </a:r>
+            <a:endParaRPr lang="en-US" dirty="0"/>
+          </a:p>
+        </p:txBody>
+      </p:sp>
+    </p:spTree>
+  </p:cSld>
+  <p:clrMapOvr>
+    <a:masterClrMapping/>
+  </p:clrMapOvr>
+</p:sld>
+</file>
+
+<file path=ppt/slides/slide6.xml><?xml version="1.0" encoding="utf-8"?>
+<p:sld xmlns:a="http://schemas.openxmlformats.org/drawingml/2006/main" xmlns:r="http://schemas.openxmlformats.org/officeDocument/2006/relationships" xmlns:p="http://schemas.openxmlformats.org/presentationml/2006/main">
+  <p:cSld>
+    <p:spTree>
+      <p:nvGrpSpPr>
+        <p:cNvPr id="1" name=""/>
+        <p:cNvGrpSpPr/>
+        <p:nvPr/>
+      </p:nvGrpSpPr>
+      <p:grpSpPr>
+        <a:xfrm>
+          <a:off x="0" y="0"/>
+          <a:ext cx="0" cy="0"/>
+          <a:chOff x="0" y="0"/>
+          <a:chExt cx="0" cy="0"/>
+        </a:xfrm>
+      </p:grpSpPr>
+      <p:sp>
+        <p:nvSpPr>
+          <p:cNvPr id="4" name="Title 3"/>
+          <p:cNvSpPr>
+            <a:spLocks noGrp="1"/>
+          </p:cNvSpPr>
+          <p:nvPr>
+            <p:ph type="ctrTitle"/>
+          </p:nvPr>
+        </p:nvSpPr>
+        <p:spPr>
+          <a:xfrm>
+            <a:off x="685800" y="2416175"/>
+            <a:ext cx="7772400" cy="1470025"/>
+          </a:xfrm>
+        </p:spPr>
+        <p:txBody>
+          <a:bodyPr/>
+          <a:lstStyle/>
+          <a:p>
+            <a:r>
+              <a:rPr lang="en-US" dirty="0" smtClean="0"/>
+              <a:t>Python</a:t>
             </a:r>
             <a:endParaRPr lang="en-US" dirty="0"/>
           </a:p>

</xml_diff>